<commit_message>
inor tweaks. Published as pdf.
</commit_message>
<xml_diff>
--- a/BuildingAwesome/BuildingAwesome.pptx
+++ b/BuildingAwesome/BuildingAwesome.pptx
@@ -1812,6 +1812,15 @@
           <a:p>
             <a:r>
               <a:rPr lang="en-US" dirty="0"/>
+              <a:t>[pause]</a:t>
+            </a:r>
+          </a:p>
+          <a:p>
+            <a:endParaRPr lang="en-US" dirty="0"/>
+          </a:p>
+          <a:p>
+            <a:r>
+              <a:rPr lang="en-US" dirty="0"/>
               <a:t>I mentioned earlier that </a:t>
             </a:r>
             <a:r>
@@ -3927,15 +3936,7 @@
           <a:p>
             <a:r>
               <a:rPr lang="en-US" dirty="0"/>
-              <a:t>Shown here in </a:t>
-            </a:r>
-            <a:r>
-              <a:rPr lang="en-US" dirty="0" err="1"/>
-              <a:t>Yello</a:t>
-            </a:r>
-            <a:r>
-              <a:rPr lang="en-US" dirty="0"/>
-              <a:t>.</a:t>
+              <a:t>Shown here in Yellow.</a:t>
             </a:r>
           </a:p>
           <a:p>
@@ -4685,6 +4686,15 @@
               <a:t>JSON </a:t>
             </a:r>
           </a:p>
+          <a:p>
+            <a:endParaRPr lang="en-US" dirty="0"/>
+          </a:p>
+          <a:p>
+            <a:r>
+              <a:rPr lang="en-US" dirty="0"/>
+              <a:t>Which we used before.</a:t>
+            </a:r>
+          </a:p>
         </p:txBody>
       </p:sp>
       <p:sp>
@@ -5207,7 +5217,37 @@
           <a:p>
             <a:r>
               <a:rPr lang="en-US" dirty="0"/>
-              <a:t>together can be really powerful.</a:t>
+              <a:t>together can be really powerful</a:t>
+            </a:r>
+          </a:p>
+          <a:p>
+            <a:r>
+              <a:rPr lang="en-US" dirty="0"/>
+              <a:t>As it allows you to mutate</a:t>
+            </a:r>
+          </a:p>
+          <a:p>
+            <a:r>
+              <a:rPr lang="en-US" dirty="0"/>
+              <a:t>Your configuration</a:t>
+            </a:r>
+          </a:p>
+          <a:p>
+            <a:r>
+              <a:rPr lang="en-US" dirty="0"/>
+              <a:t>Based on external information</a:t>
+            </a:r>
+          </a:p>
+          <a:p>
+            <a:r>
+              <a:rPr lang="en-US" dirty="0"/>
+              <a:t>Like environment variables</a:t>
+            </a:r>
+          </a:p>
+          <a:p>
+            <a:r>
+              <a:rPr lang="en-US" dirty="0"/>
+              <a:t>Or hostname.</a:t>
             </a:r>
           </a:p>
           <a:p>
@@ -6346,12 +6386,6 @@
           <a:p>
             <a:r>
               <a:rPr lang="en-US" dirty="0"/>
-              <a:t>on port 80 </a:t>
-            </a:r>
-          </a:p>
-          <a:p>
-            <a:r>
-              <a:rPr lang="en-US" dirty="0"/>
               <a:t>and serving requests:</a:t>
             </a:r>
           </a:p>
@@ -8590,36 +8624,6 @@
           <a:p>
             <a:endParaRPr lang="en-US" dirty="0"/>
           </a:p>
-          <a:p>
-            <a:r>
-              <a:rPr lang="en-US" dirty="0"/>
-              <a:t>The key objective for this function</a:t>
-            </a:r>
-          </a:p>
-          <a:p>
-            <a:r>
-              <a:rPr lang="en-US" dirty="0"/>
-              <a:t>is to get a list of all the .jpg files on the disk</a:t>
-            </a:r>
-          </a:p>
-          <a:p>
-            <a:r>
-              <a:rPr lang="en-US" dirty="0"/>
-              <a:t>trim the .jpg off those names,</a:t>
-            </a:r>
-          </a:p>
-          <a:p>
-            <a:r>
-              <a:rPr lang="en-US" dirty="0"/>
-              <a:t>and return that as a json array of our ids</a:t>
-            </a:r>
-          </a:p>
-          <a:p>
-            <a:r>
-              <a:rPr lang="en-US" dirty="0"/>
-              <a:t>from those filename.</a:t>
-            </a:r>
-          </a:p>
         </p:txBody>
       </p:sp>
       <p:sp>
@@ -8704,6 +8708,39 @@
           <a:p>
             <a:r>
               <a:rPr lang="en-US" dirty="0"/>
+              <a:t>The key objective for this function</a:t>
+            </a:r>
+          </a:p>
+          <a:p>
+            <a:r>
+              <a:rPr lang="en-US" dirty="0"/>
+              <a:t>is to get a list of all the .jpg files on the disk</a:t>
+            </a:r>
+          </a:p>
+          <a:p>
+            <a:r>
+              <a:rPr lang="en-US" dirty="0"/>
+              <a:t>trim the .jpg off those names,</a:t>
+            </a:r>
+          </a:p>
+          <a:p>
+            <a:r>
+              <a:rPr lang="en-US" dirty="0"/>
+              <a:t>and return that as a json array of our ids</a:t>
+            </a:r>
+          </a:p>
+          <a:p>
+            <a:r>
+              <a:rPr lang="en-US" dirty="0"/>
+              <a:t>from those filenames.</a:t>
+            </a:r>
+          </a:p>
+          <a:p>
+            <a:endParaRPr lang="en-US" dirty="0"/>
+          </a:p>
+          <a:p>
+            <a:r>
+              <a:rPr lang="en-US" dirty="0"/>
               <a:t>I'm not going to go into this,</a:t>
             </a:r>
           </a:p>
@@ -9569,7 +9606,7 @@
           <a:p>
             <a:r>
               <a:rPr lang="en-US" dirty="0"/>
-              <a:t>and start </a:t>
+              <a:t>and starting</a:t>
             </a:r>
           </a:p>
           <a:p>
@@ -10015,7 +10052,61 @@
             <a:endParaRPr lang="en-US" dirty="0"/>
           </a:p>
           <a:p>
+            <a:r>
+              <a:rPr lang="en-US" dirty="0"/>
+              <a:t>Each incoming request</a:t>
+            </a:r>
+          </a:p>
+          <a:p>
+            <a:r>
+              <a:rPr lang="en-US" dirty="0"/>
+              <a:t>Can match multiple routes</a:t>
+            </a:r>
+          </a:p>
+          <a:p>
+            <a:r>
+              <a:rPr lang="en-US" dirty="0"/>
+              <a:t>And each route is executed </a:t>
+            </a:r>
+          </a:p>
+          <a:p>
+            <a:r>
+              <a:rPr lang="en-US" dirty="0"/>
+              <a:t>In the given order</a:t>
+            </a:r>
+          </a:p>
+          <a:p>
+            <a:r>
+              <a:rPr lang="en-US" dirty="0"/>
+              <a:t>Until the outgoing response</a:t>
+            </a:r>
+          </a:p>
+          <a:p>
+            <a:r>
+              <a:rPr lang="en-US" dirty="0"/>
+              <a:t>Is closed.</a:t>
+            </a:r>
+          </a:p>
+          <a:p>
             <a:endParaRPr lang="en-US" dirty="0"/>
+          </a:p>
+          <a:p>
+            <a:r>
+              <a:rPr lang="en-US" dirty="0"/>
+              <a:t>So a request to /kittens </a:t>
+            </a:r>
+          </a:p>
+          <a:p>
+            <a:r>
+              <a:rPr lang="en-US" dirty="0"/>
+              <a:t>Will match both routes,</a:t>
+            </a:r>
+          </a:p>
+          <a:p>
+            <a:r>
+              <a:rPr lang="en-US" dirty="0"/>
+              <a:t>And each will execute.</a:t>
+            </a:r>
           </a:p>
         </p:txBody>
       </p:sp>
@@ -11357,8 +11448,11 @@
           <a:p>
             <a:r>
               <a:rPr lang="en-US" dirty="0"/>
-              <a:t>Also, </a:t>
-            </a:r>
+              <a:t>Also…</a:t>
+            </a:r>
+          </a:p>
+          <a:p>
+            <a:endParaRPr lang="en-US" dirty="0"/>
           </a:p>
           <a:p>
             <a:r>
@@ -11389,19 +11483,23 @@
           <a:p>
             <a:r>
               <a:rPr lang="en-US" dirty="0"/>
-              <a:t>and tell me if you are going</a:t>
-            </a:r>
-          </a:p>
-          <a:p>
-            <a:r>
-              <a:rPr lang="en-US" dirty="0"/>
-              <a:t>to try any of the stuff I showed tonight</a:t>
-            </a:r>
-          </a:p>
-          <a:p>
-            <a:r>
-              <a:rPr lang="en-US" dirty="0"/>
-              <a:t>out and you can have one!</a:t>
+              <a:t>and tell me if you are going to try </a:t>
+            </a:r>
+          </a:p>
+          <a:p>
+            <a:r>
+              <a:rPr lang="en-US" dirty="0"/>
+              <a:t>any of the stuff I showed tonight</a:t>
+            </a:r>
+          </a:p>
+          <a:p>
+            <a:r>
+              <a:rPr lang="en-US"/>
+              <a:t>and </a:t>
+            </a:r>
+            <a:r>
+              <a:rPr lang="en-US" dirty="0"/>
+              <a:t>you can have one!</a:t>
             </a:r>
           </a:p>
           <a:p>
@@ -28402,8 +28500,8 @@
         </p:nvSpPr>
         <p:spPr>
           <a:xfrm>
-            <a:off x="6013344" y="1370322"/>
-            <a:ext cx="5507064" cy="2762560"/>
+            <a:off x="6096000" y="1273641"/>
+            <a:ext cx="5507064" cy="3030883"/>
           </a:xfrm>
           <a:prstGeom prst="rect">
             <a:avLst/>
@@ -28525,8 +28623,15 @@
                   <a:schemeClr val="tx1"/>
                 </a:solidFill>
               </a:rPr>
-              <a:t>"./MyController.js"</a:t>
-            </a:r>
+              <a:t>"./MyController.js“</a:t>
+            </a:r>
+          </a:p>
+          <a:p>
+            <a:endParaRPr lang="en-US" sz="2400" b="1" dirty="0">
+              <a:solidFill>
+                <a:schemeClr val="tx1"/>
+              </a:solidFill>
+            </a:endParaRPr>
           </a:p>
           <a:p>
             <a:r>

</xml_diff>

<commit_message>
Final Final version of slides.
</commit_message>
<xml_diff>
--- a/BuildingAwesome/BuildingAwesome.pptx
+++ b/BuildingAwesome/BuildingAwesome.pptx
@@ -2949,7 +2949,7 @@
           <a:p>
             <a:r>
               <a:rPr lang="en-US" dirty="0"/>
-              <a:t>variables to reference one part of your configuration from another;</a:t>
+              <a:t>variables,</a:t>
             </a:r>
           </a:p>
           <a:p>
@@ -4227,7 +4227,13 @@
           <a:p>
             <a:r>
               <a:rPr lang="en-US" dirty="0"/>
-              <a:t>and if it is a valid config use it.</a:t>
+              <a:t>and if it is a valid config </a:t>
+            </a:r>
+          </a:p>
+          <a:p>
+            <a:r>
+              <a:rPr lang="en-US" dirty="0"/>
+              <a:t>use it.</a:t>
             </a:r>
           </a:p>
         </p:txBody>
@@ -4692,7 +4698,7 @@
           <a:p>
             <a:r>
               <a:rPr lang="en-US" dirty="0"/>
-              <a:t>Which we used before.</a:t>
+              <a:t>Which we have seen before.</a:t>
             </a:r>
           </a:p>
         </p:txBody>
@@ -4902,6 +4908,15 @@
               <a:t>Key/Value pairs</a:t>
             </a:r>
           </a:p>
+          <a:p>
+            <a:endParaRPr lang="en-US" dirty="0"/>
+          </a:p>
+          <a:p>
+            <a:r>
+              <a:rPr lang="en-US" dirty="0"/>
+              <a:t>Instead of JSON</a:t>
+            </a:r>
+          </a:p>
         </p:txBody>
       </p:sp>
       <p:sp>
@@ -5097,6 +5112,65 @@
               <a:t>from another part of your configuration.</a:t>
             </a:r>
           </a:p>
+          <a:p>
+            <a:endParaRPr lang="en-US" dirty="0"/>
+          </a:p>
+          <a:p>
+            <a:r>
+              <a:rPr lang="en-US" dirty="0"/>
+              <a:t>Here server.url </a:t>
+            </a:r>
+          </a:p>
+          <a:p>
+            <a:r>
+              <a:rPr lang="en-US" dirty="0"/>
+              <a:t>will be resolved </a:t>
+            </a:r>
+          </a:p>
+          <a:p>
+            <a:r>
+              <a:rPr lang="en-US" dirty="0"/>
+              <a:t>To be a concatenation</a:t>
+            </a:r>
+          </a:p>
+          <a:p>
+            <a:r>
+              <a:rPr lang="en-US" dirty="0"/>
+              <a:t>Of </a:t>
+            </a:r>
+            <a:r>
+              <a:rPr lang="en-US" dirty="0" err="1"/>
+              <a:t>server.scheme</a:t>
+            </a:r>
+            <a:r>
+              <a:rPr lang="en-US" dirty="0"/>
+              <a:t>, </a:t>
+            </a:r>
+          </a:p>
+          <a:p>
+            <a:r>
+              <a:rPr lang="en-US" dirty="0" err="1"/>
+              <a:t>Server.hostname</a:t>
+            </a:r>
+            <a:r>
+              <a:rPr lang="en-US" dirty="0"/>
+              <a:t>, </a:t>
+            </a:r>
+          </a:p>
+          <a:p>
+            <a:r>
+              <a:rPr lang="en-US" dirty="0"/>
+              <a:t>And </a:t>
+            </a:r>
+            <a:r>
+              <a:rPr lang="en-US" dirty="0" err="1"/>
+              <a:t>server.port</a:t>
+            </a:r>
+            <a:r>
+              <a:rPr lang="en-US" dirty="0"/>
+              <a:t>.</a:t>
+            </a:r>
+          </a:p>
         </p:txBody>
       </p:sp>
       <p:sp>
@@ -5211,6 +5285,42 @@
           <a:p>
             <a:r>
               <a:rPr lang="en-US" dirty="0"/>
+              <a:t>In our example here</a:t>
+            </a:r>
+          </a:p>
+          <a:p>
+            <a:r>
+              <a:rPr lang="en-US" dirty="0"/>
+              <a:t>Our condition tests the environment variable TARGET</a:t>
+            </a:r>
+          </a:p>
+          <a:p>
+            <a:r>
+              <a:rPr lang="en-US" dirty="0"/>
+              <a:t>To see if it equals “production” or not.</a:t>
+            </a:r>
+          </a:p>
+          <a:p>
+            <a:r>
+              <a:rPr lang="en-US" dirty="0"/>
+              <a:t>The following configuration only applies if it does.</a:t>
+            </a:r>
+          </a:p>
+          <a:p>
+            <a:endParaRPr lang="en-US" dirty="0"/>
+          </a:p>
+          <a:p>
+            <a:r>
+              <a:rPr lang="en-US" dirty="0"/>
+              <a:t>[pause]</a:t>
+            </a:r>
+          </a:p>
+          <a:p>
+            <a:endParaRPr lang="en-US" dirty="0"/>
+          </a:p>
+          <a:p>
+            <a:r>
+              <a:rPr lang="en-US" dirty="0"/>
               <a:t>Variables and conditions when used</a:t>
             </a:r>
           </a:p>
@@ -7010,6 +7120,15 @@
             <a:endParaRPr lang="en-US" dirty="0"/>
           </a:p>
           <a:p>
+            <a:r>
+              <a:rPr lang="en-US" dirty="0"/>
+              <a:t>[pause]</a:t>
+            </a:r>
+          </a:p>
+          <a:p>
+            <a:endParaRPr lang="en-US" dirty="0"/>
+          </a:p>
+          <a:p>
             <a:pPr marL="0" marR="0" lvl="0" indent="0" algn="l" defTabSz="914400" rtl="0" eaLnBrk="1" fontAlgn="auto" latinLnBrk="0" hangingPunct="1">
               <a:lnSpc>
                 <a:spcPct val="100000"/>
@@ -7500,15 +7619,29 @@
           </a:p>
           <a:p>
             <a:r>
-              <a:rPr lang="en-US" dirty="0" err="1"/>
-              <a:t>RegEx</a:t>
-            </a:r>
+              <a:rPr lang="en-US" dirty="0"/>
+              <a:t>Regular Expression</a:t>
+            </a:r>
+          </a:p>
+          <a:p>
             <a:endParaRPr lang="en-US" dirty="0"/>
           </a:p>
           <a:p>
             <a:r>
               <a:rPr lang="en-US" dirty="0"/>
               <a:t>or an OR EXPRESSION separated by PIPE "|" characters</a:t>
+            </a:r>
+          </a:p>
+          <a:p>
+            <a:r>
+              <a:rPr lang="en-US" dirty="0"/>
+              <a:t>To handle multiple paths</a:t>
+            </a:r>
+          </a:p>
+          <a:p>
+            <a:r>
+              <a:rPr lang="en-US" dirty="0"/>
+              <a:t>With a single route.</a:t>
             </a:r>
           </a:p>
         </p:txBody>
@@ -7595,6 +7728,12 @@
           <a:p>
             <a:r>
               <a:rPr lang="en-US" dirty="0"/>
+              <a:t>The third argument is</a:t>
+            </a:r>
+          </a:p>
+          <a:p>
+            <a:r>
+              <a:rPr lang="en-US" dirty="0"/>
               <a:t>The Handler</a:t>
             </a:r>
           </a:p>
@@ -7605,22 +7744,34 @@
             </a:r>
           </a:p>
           <a:p>
+            <a:endParaRPr lang="en-US" dirty="0"/>
+          </a:p>
+          <a:p>
             <a:r>
               <a:rPr lang="en-US" dirty="0"/>
               <a:t>a function</a:t>
             </a:r>
           </a:p>
           <a:p>
+            <a:endParaRPr lang="en-US" dirty="0"/>
+          </a:p>
+          <a:p>
             <a:r>
               <a:rPr lang="en-US" dirty="0"/>
               <a:t>a Controller</a:t>
             </a:r>
           </a:p>
           <a:p>
+            <a:endParaRPr lang="en-US" dirty="0"/>
+          </a:p>
+          <a:p>
             <a:r>
               <a:rPr lang="en-US" dirty="0"/>
               <a:t>a Filename String</a:t>
             </a:r>
+          </a:p>
+          <a:p>
+            <a:endParaRPr lang="en-US" dirty="0"/>
           </a:p>
           <a:p>
             <a:r>
@@ -7795,7 +7946,10 @@
             </a:r>
           </a:p>
           <a:p>
-            <a:endParaRPr lang="en-US" dirty="0"/>
+            <a:r>
+              <a:rPr lang="en-US" dirty="0"/>
+              <a:t>As shown here.</a:t>
+            </a:r>
           </a:p>
         </p:txBody>
       </p:sp>
@@ -8123,7 +8277,7 @@
           <a:p>
             <a:r>
               <a:rPr lang="en-US" dirty="0"/>
-              <a:t>that will server up images of kittens.</a:t>
+              <a:t>that will serve up images of kittens.</a:t>
             </a:r>
           </a:p>
           <a:p>
@@ -8153,7 +8307,13 @@
           <a:p>
             <a:r>
               <a:rPr lang="en-US" dirty="0"/>
-              <a:t>Additionally, we will log each request we get out.</a:t>
+              <a:t>Additionally, we will log each request we get out</a:t>
+            </a:r>
+          </a:p>
+          <a:p>
+            <a:r>
+              <a:rPr lang="en-US" dirty="0"/>
+              <a:t>So we have traceability.</a:t>
             </a:r>
           </a:p>
           <a:p>
@@ -9600,13 +9760,13 @@
           <a:p>
             <a:r>
               <a:rPr lang="en-US" dirty="0"/>
-              <a:t>Initialize </a:t>
-            </a:r>
-          </a:p>
-          <a:p>
-            <a:r>
-              <a:rPr lang="en-US" dirty="0"/>
-              <a:t>and starting</a:t>
+              <a:t>Then we Initialize </a:t>
+            </a:r>
+          </a:p>
+          <a:p>
+            <a:r>
+              <a:rPr lang="en-US" dirty="0"/>
+              <a:t>and start</a:t>
             </a:r>
           </a:p>
           <a:p>

</xml_diff>